<commit_message>
add interp workshop slides
</commit_message>
<xml_diff>
--- a/_notes/cheat_sheets/interp.pptx
+++ b/_notes/cheat_sheets/interp.pptx
@@ -243,7 +243,7 @@
           <a:p>
             <a:fld id="{77040EC6-3E23-6D41-A5C2-1A6F3932B456}" type="datetimeFigureOut">
               <a:rPr lang="en-US" smtClean="0"/>
-              <a:t>6/11/19</a:t>
+              <a:t>6/25/19</a:t>
             </a:fld>
             <a:endParaRPr lang="en-US"/>
           </a:p>
@@ -413,7 +413,7 @@
           <a:p>
             <a:fld id="{77040EC6-3E23-6D41-A5C2-1A6F3932B456}" type="datetimeFigureOut">
               <a:rPr lang="en-US" smtClean="0"/>
-              <a:t>6/11/19</a:t>
+              <a:t>6/25/19</a:t>
             </a:fld>
             <a:endParaRPr lang="en-US"/>
           </a:p>
@@ -593,7 +593,7 @@
           <a:p>
             <a:fld id="{77040EC6-3E23-6D41-A5C2-1A6F3932B456}" type="datetimeFigureOut">
               <a:rPr lang="en-US" smtClean="0"/>
-              <a:t>6/11/19</a:t>
+              <a:t>6/25/19</a:t>
             </a:fld>
             <a:endParaRPr lang="en-US"/>
           </a:p>
@@ -762,7 +762,7 @@
           <a:p>
             <a:fld id="{77040EC6-3E23-6D41-A5C2-1A6F3932B456}" type="datetimeFigureOut">
               <a:rPr lang="en-US" smtClean="0"/>
-              <a:t>6/11/19</a:t>
+              <a:t>6/25/19</a:t>
             </a:fld>
             <a:endParaRPr lang="en-US"/>
           </a:p>
@@ -1006,7 +1006,7 @@
           <a:p>
             <a:fld id="{77040EC6-3E23-6D41-A5C2-1A6F3932B456}" type="datetimeFigureOut">
               <a:rPr lang="en-US" smtClean="0"/>
-              <a:t>6/11/19</a:t>
+              <a:t>6/25/19</a:t>
             </a:fld>
             <a:endParaRPr lang="en-US"/>
           </a:p>
@@ -1238,7 +1238,7 @@
           <a:p>
             <a:fld id="{77040EC6-3E23-6D41-A5C2-1A6F3932B456}" type="datetimeFigureOut">
               <a:rPr lang="en-US" smtClean="0"/>
-              <a:t>6/11/19</a:t>
+              <a:t>6/25/19</a:t>
             </a:fld>
             <a:endParaRPr lang="en-US"/>
           </a:p>
@@ -1605,7 +1605,7 @@
           <a:p>
             <a:fld id="{77040EC6-3E23-6D41-A5C2-1A6F3932B456}" type="datetimeFigureOut">
               <a:rPr lang="en-US" smtClean="0"/>
-              <a:t>6/11/19</a:t>
+              <a:t>6/25/19</a:t>
             </a:fld>
             <a:endParaRPr lang="en-US"/>
           </a:p>
@@ -1723,7 +1723,7 @@
           <a:p>
             <a:fld id="{77040EC6-3E23-6D41-A5C2-1A6F3932B456}" type="datetimeFigureOut">
               <a:rPr lang="en-US" smtClean="0"/>
-              <a:t>6/11/19</a:t>
+              <a:t>6/25/19</a:t>
             </a:fld>
             <a:endParaRPr lang="en-US"/>
           </a:p>
@@ -1818,7 +1818,7 @@
           <a:p>
             <a:fld id="{77040EC6-3E23-6D41-A5C2-1A6F3932B456}" type="datetimeFigureOut">
               <a:rPr lang="en-US" smtClean="0"/>
-              <a:t>6/11/19</a:t>
+              <a:t>6/25/19</a:t>
             </a:fld>
             <a:endParaRPr lang="en-US"/>
           </a:p>
@@ -2095,7 +2095,7 @@
           <a:p>
             <a:fld id="{77040EC6-3E23-6D41-A5C2-1A6F3932B456}" type="datetimeFigureOut">
               <a:rPr lang="en-US" smtClean="0"/>
-              <a:t>6/11/19</a:t>
+              <a:t>6/25/19</a:t>
             </a:fld>
             <a:endParaRPr lang="en-US"/>
           </a:p>
@@ -2352,7 +2352,7 @@
           <a:p>
             <a:fld id="{77040EC6-3E23-6D41-A5C2-1A6F3932B456}" type="datetimeFigureOut">
               <a:rPr lang="en-US" smtClean="0"/>
-              <a:t>6/11/19</a:t>
+              <a:t>6/25/19</a:t>
             </a:fld>
             <a:endParaRPr lang="en-US"/>
           </a:p>
@@ -2565,7 +2565,7 @@
           <a:p>
             <a:fld id="{77040EC6-3E23-6D41-A5C2-1A6F3932B456}" type="datetimeFigureOut">
               <a:rPr lang="en-US" smtClean="0"/>
-              <a:t>6/11/19</a:t>
+              <a:t>6/25/19</a:t>
             </a:fld>
             <a:endParaRPr lang="en-US"/>
           </a:p>
@@ -3739,7 +3739,7 @@
         </p:nvSpPr>
         <p:spPr>
           <a:xfrm>
-            <a:off x="6158122" y="4867620"/>
+            <a:off x="6158122" y="4957265"/>
             <a:ext cx="911930" cy="393576"/>
           </a:xfrm>
           <a:prstGeom prst="rect">
@@ -5777,6 +5777,22 @@
               </a:rPr>
               <a:t>TCAV</a:t>
             </a:r>
+            <a:r>
+              <a:rPr lang="en-US" sz="1000" baseline="30000" dirty="0">
+                <a:solidFill>
+                  <a:schemeClr val="tx1"/>
+                </a:solidFill>
+                <a:cs typeface="Times New Roman" panose="02020603050405020304" pitchFamily="18" charset="0"/>
+              </a:rPr>
+              <a:t>*</a:t>
+            </a:r>
+            <a:endParaRPr lang="en-US" sz="1000" dirty="0">
+              <a:solidFill>
+                <a:schemeClr val="tx1"/>
+              </a:solidFill>
+              <a:latin typeface="+mj-lt"/>
+              <a:cs typeface="Times New Roman" panose="02020603050405020304" pitchFamily="18" charset="0"/>
+            </a:endParaRPr>
           </a:p>
         </p:txBody>
       </p:sp>
@@ -5847,6 +5863,22 @@
               </a:rPr>
               <a:t>Influence functions</a:t>
             </a:r>
+            <a:r>
+              <a:rPr lang="en-US" sz="1000" baseline="30000" dirty="0">
+                <a:solidFill>
+                  <a:schemeClr val="tx1"/>
+                </a:solidFill>
+                <a:cs typeface="Times New Roman" panose="02020603050405020304" pitchFamily="18" charset="0"/>
+              </a:rPr>
+              <a:t>*</a:t>
+            </a:r>
+            <a:endParaRPr lang="en-US" sz="1000" dirty="0">
+              <a:solidFill>
+                <a:schemeClr val="tx1"/>
+              </a:solidFill>
+              <a:latin typeface="+mj-lt"/>
+              <a:cs typeface="Times New Roman" panose="02020603050405020304" pitchFamily="18" charset="0"/>
+            </a:endParaRPr>
           </a:p>
         </p:txBody>
       </p:sp>
@@ -6011,7 +6043,7 @@
         </p:nvSpPr>
         <p:spPr>
           <a:xfrm>
-            <a:off x="5987970" y="3152168"/>
+            <a:off x="5987970" y="2775659"/>
             <a:ext cx="612443" cy="393576"/>
           </a:xfrm>
           <a:prstGeom prst="rect">
@@ -6081,7 +6113,7 @@
         </p:nvSpPr>
         <p:spPr>
           <a:xfrm>
-            <a:off x="6735688" y="3162215"/>
+            <a:off x="6735688" y="2785706"/>
             <a:ext cx="772300" cy="393576"/>
           </a:xfrm>
           <a:prstGeom prst="rect">
@@ -6151,7 +6183,7 @@
         </p:nvSpPr>
         <p:spPr>
           <a:xfrm>
-            <a:off x="6042809" y="5418969"/>
+            <a:off x="6042809" y="5472756"/>
             <a:ext cx="1115207" cy="520256"/>
           </a:xfrm>
           <a:prstGeom prst="rect">
@@ -6333,7 +6365,7 @@
         </p:nvCxnSpPr>
         <p:spPr>
           <a:xfrm flipV="1">
-            <a:off x="6279839" y="2247768"/>
+            <a:off x="6190194" y="2032620"/>
             <a:ext cx="0" cy="538132"/>
           </a:xfrm>
           <a:prstGeom prst="straightConnector1">
@@ -6384,8 +6416,8 @@
         </p:nvCxnSpPr>
         <p:spPr>
           <a:xfrm flipV="1">
-            <a:off x="6992364" y="3910856"/>
-            <a:ext cx="0" cy="538132"/>
+            <a:off x="6992364" y="3301258"/>
+            <a:ext cx="0" cy="402594"/>
           </a:xfrm>
           <a:prstGeom prst="straightConnector1">
             <a:avLst/>
@@ -6821,7 +6853,7 @@
         </p:nvSpPr>
         <p:spPr>
           <a:xfrm>
-            <a:off x="6034668" y="4056739"/>
+            <a:off x="6030149" y="3285586"/>
             <a:ext cx="965946" cy="461665"/>
           </a:xfrm>
           <a:prstGeom prst="rect">
@@ -6872,7 +6904,7 @@
         </p:nvSpPr>
         <p:spPr>
           <a:xfrm>
-            <a:off x="6573228" y="2302510"/>
+            <a:off x="6483583" y="2087362"/>
             <a:ext cx="965946" cy="584775"/>
           </a:xfrm>
           <a:prstGeom prst="rect">
@@ -7020,6 +7052,156 @@
                 <a:cs typeface="Times New Roman" panose="02020603050405020304" pitchFamily="18" charset="0"/>
               </a:rPr>
               <a:t>Black-box model</a:t>
+            </a:r>
+          </a:p>
+        </p:txBody>
+      </p:sp>
+      <p:sp>
+        <p:nvSpPr>
+          <p:cNvPr id="56" name="Rectangle 55">
+            <a:extLst>
+              <a:ext uri="{FF2B5EF4-FFF2-40B4-BE49-F238E27FC236}">
+                <a16:creationId xmlns:a16="http://schemas.microsoft.com/office/drawing/2014/main" id="{96896C1A-01A8-C44B-9D11-73D500CBB722}"/>
+              </a:ext>
+            </a:extLst>
+          </p:cNvPr>
+          <p:cNvSpPr/>
+          <p:nvPr/>
+        </p:nvSpPr>
+        <p:spPr>
+          <a:xfrm>
+            <a:off x="6132157" y="4426808"/>
+            <a:ext cx="911930" cy="393576"/>
+          </a:xfrm>
+          <a:prstGeom prst="rect">
+            <a:avLst/>
+          </a:prstGeom>
+          <a:solidFill>
+            <a:srgbClr val="72D7BD"/>
+          </a:solidFill>
+          <a:ln w="38100">
+            <a:solidFill>
+              <a:srgbClr val="00C592"/>
+            </a:solidFill>
+          </a:ln>
+          <a:effectLst>
+            <a:outerShdw blurRad="50800" dist="38100" dir="2700000" algn="tl" rotWithShape="0">
+              <a:prstClr val="black">
+                <a:alpha val="40000"/>
+              </a:prstClr>
+            </a:outerShdw>
+          </a:effectLst>
+        </p:spPr>
+        <p:style>
+          <a:lnRef idx="2">
+            <a:schemeClr val="accent6">
+              <a:shade val="50000"/>
+            </a:schemeClr>
+          </a:lnRef>
+          <a:fillRef idx="1">
+            <a:schemeClr val="accent6"/>
+          </a:fillRef>
+          <a:effectRef idx="0">
+            <a:schemeClr val="accent6"/>
+          </a:effectRef>
+          <a:fontRef idx="minor">
+            <a:schemeClr val="lt1"/>
+          </a:fontRef>
+        </p:style>
+        <p:txBody>
+          <a:bodyPr rtlCol="0" anchor="ctr"/>
+          <a:lstStyle/>
+          <a:p>
+            <a:pPr algn="ctr"/>
+            <a:r>
+              <a:rPr lang="en-US" sz="1000" dirty="0">
+                <a:solidFill>
+                  <a:schemeClr val="tx1"/>
+                </a:solidFill>
+                <a:latin typeface="+mj-lt"/>
+                <a:cs typeface="Times New Roman" panose="02020603050405020304" pitchFamily="18" charset="0"/>
+              </a:rPr>
+              <a:t>Delta Index</a:t>
+            </a:r>
+          </a:p>
+        </p:txBody>
+      </p:sp>
+      <p:sp>
+        <p:nvSpPr>
+          <p:cNvPr id="58" name="Rectangle 57">
+            <a:extLst>
+              <a:ext uri="{FF2B5EF4-FFF2-40B4-BE49-F238E27FC236}">
+                <a16:creationId xmlns:a16="http://schemas.microsoft.com/office/drawing/2014/main" id="{A82B624E-FB8F-3342-AA72-E103ADBE3CAB}"/>
+              </a:ext>
+            </a:extLst>
+          </p:cNvPr>
+          <p:cNvSpPr/>
+          <p:nvPr/>
+        </p:nvSpPr>
+        <p:spPr>
+          <a:xfrm>
+            <a:off x="6092653" y="3915351"/>
+            <a:ext cx="1040947" cy="402246"/>
+          </a:xfrm>
+          <a:prstGeom prst="rect">
+            <a:avLst/>
+          </a:prstGeom>
+          <a:solidFill>
+            <a:srgbClr val="72D7BD"/>
+          </a:solidFill>
+          <a:ln w="38100">
+            <a:solidFill>
+              <a:srgbClr val="00C592"/>
+            </a:solidFill>
+          </a:ln>
+          <a:effectLst>
+            <a:outerShdw blurRad="50800" dist="38100" dir="2700000" algn="tl" rotWithShape="0">
+              <a:prstClr val="black">
+                <a:alpha val="40000"/>
+              </a:prstClr>
+            </a:outerShdw>
+          </a:effectLst>
+        </p:spPr>
+        <p:style>
+          <a:lnRef idx="2">
+            <a:schemeClr val="accent6">
+              <a:shade val="50000"/>
+            </a:schemeClr>
+          </a:lnRef>
+          <a:fillRef idx="1">
+            <a:schemeClr val="accent6"/>
+          </a:fillRef>
+          <a:effectRef idx="0">
+            <a:schemeClr val="accent6"/>
+          </a:effectRef>
+          <a:fontRef idx="minor">
+            <a:schemeClr val="lt1"/>
+          </a:fontRef>
+        </p:style>
+        <p:txBody>
+          <a:bodyPr rtlCol="0" anchor="ctr"/>
+          <a:lstStyle/>
+          <a:p>
+            <a:pPr algn="ctr"/>
+            <a:r>
+              <a:rPr lang="en-US" sz="1000" dirty="0" err="1">
+                <a:solidFill>
+                  <a:schemeClr val="tx1"/>
+                </a:solidFill>
+                <a:latin typeface="+mj-lt"/>
+                <a:cs typeface="Times New Roman" panose="02020603050405020304" pitchFamily="18" charset="0"/>
+              </a:rPr>
+              <a:t>Sobol’s</a:t>
+            </a:r>
+            <a:r>
+              <a:rPr lang="en-US" sz="1000" dirty="0">
+                <a:solidFill>
+                  <a:schemeClr val="tx1"/>
+                </a:solidFill>
+                <a:latin typeface="+mj-lt"/>
+                <a:cs typeface="Times New Roman" panose="02020603050405020304" pitchFamily="18" charset="0"/>
+              </a:rPr>
+              <a:t> Indices</a:t>
             </a:r>
           </a:p>
         </p:txBody>

</xml_diff>